<commit_message>
changes in the files
</commit_message>
<xml_diff>
--- a/EXL hackathon.pptx
+++ b/EXL hackathon.pptx
@@ -6,16 +6,17 @@
   </p:sldMasterIdLst>
   <p:sldIdLst>
     <p:sldId id="256" r:id="rId2"/>
-    <p:sldId id="266" r:id="rId3"/>
-    <p:sldId id="257" r:id="rId4"/>
+    <p:sldId id="257" r:id="rId3"/>
+    <p:sldId id="266" r:id="rId4"/>
     <p:sldId id="258" r:id="rId5"/>
-    <p:sldId id="259" r:id="rId6"/>
-    <p:sldId id="261" r:id="rId7"/>
-    <p:sldId id="262" r:id="rId8"/>
-    <p:sldId id="263" r:id="rId9"/>
+    <p:sldId id="261" r:id="rId6"/>
+    <p:sldId id="262" r:id="rId7"/>
+    <p:sldId id="263" r:id="rId8"/>
+    <p:sldId id="259" r:id="rId9"/>
     <p:sldId id="260" r:id="rId10"/>
     <p:sldId id="264" r:id="rId11"/>
-    <p:sldId id="265" r:id="rId12"/>
+    <p:sldId id="267" r:id="rId12"/>
+    <p:sldId id="265" r:id="rId13"/>
   </p:sldIdLst>
   <p:sldSz cx="12192000" cy="6858000"/>
   <p:notesSz cx="6858000" cy="9144000"/>
@@ -271,7 +272,7 @@
           <a:p>
             <a:fld id="{8E855F6B-8C8A-4ACC-9008-4FFC33CA3324}" type="datetimeFigureOut">
               <a:rPr lang="en-IN" smtClean="0"/>
-              <a:t>10-07-2022</a:t>
+              <a:t>17-07-2022</a:t>
             </a:fld>
             <a:endParaRPr lang="en-IN"/>
           </a:p>
@@ -471,7 +472,7 @@
           <a:p>
             <a:fld id="{8E855F6B-8C8A-4ACC-9008-4FFC33CA3324}" type="datetimeFigureOut">
               <a:rPr lang="en-IN" smtClean="0"/>
-              <a:t>10-07-2022</a:t>
+              <a:t>17-07-2022</a:t>
             </a:fld>
             <a:endParaRPr lang="en-IN"/>
           </a:p>
@@ -681,7 +682,7 @@
           <a:p>
             <a:fld id="{8E855F6B-8C8A-4ACC-9008-4FFC33CA3324}" type="datetimeFigureOut">
               <a:rPr lang="en-IN" smtClean="0"/>
-              <a:t>10-07-2022</a:t>
+              <a:t>17-07-2022</a:t>
             </a:fld>
             <a:endParaRPr lang="en-IN"/>
           </a:p>
@@ -881,7 +882,7 @@
           <a:p>
             <a:fld id="{8E855F6B-8C8A-4ACC-9008-4FFC33CA3324}" type="datetimeFigureOut">
               <a:rPr lang="en-IN" smtClean="0"/>
-              <a:t>10-07-2022</a:t>
+              <a:t>17-07-2022</a:t>
             </a:fld>
             <a:endParaRPr lang="en-IN"/>
           </a:p>
@@ -1157,7 +1158,7 @@
           <a:p>
             <a:fld id="{8E855F6B-8C8A-4ACC-9008-4FFC33CA3324}" type="datetimeFigureOut">
               <a:rPr lang="en-IN" smtClean="0"/>
-              <a:t>10-07-2022</a:t>
+              <a:t>17-07-2022</a:t>
             </a:fld>
             <a:endParaRPr lang="en-IN"/>
           </a:p>
@@ -1425,7 +1426,7 @@
           <a:p>
             <a:fld id="{8E855F6B-8C8A-4ACC-9008-4FFC33CA3324}" type="datetimeFigureOut">
               <a:rPr lang="en-IN" smtClean="0"/>
-              <a:t>10-07-2022</a:t>
+              <a:t>17-07-2022</a:t>
             </a:fld>
             <a:endParaRPr lang="en-IN"/>
           </a:p>
@@ -1840,7 +1841,7 @@
           <a:p>
             <a:fld id="{8E855F6B-8C8A-4ACC-9008-4FFC33CA3324}" type="datetimeFigureOut">
               <a:rPr lang="en-IN" smtClean="0"/>
-              <a:t>10-07-2022</a:t>
+              <a:t>17-07-2022</a:t>
             </a:fld>
             <a:endParaRPr lang="en-IN"/>
           </a:p>
@@ -1982,7 +1983,7 @@
           <a:p>
             <a:fld id="{8E855F6B-8C8A-4ACC-9008-4FFC33CA3324}" type="datetimeFigureOut">
               <a:rPr lang="en-IN" smtClean="0"/>
-              <a:t>10-07-2022</a:t>
+              <a:t>17-07-2022</a:t>
             </a:fld>
             <a:endParaRPr lang="en-IN"/>
           </a:p>
@@ -2095,7 +2096,7 @@
           <a:p>
             <a:fld id="{8E855F6B-8C8A-4ACC-9008-4FFC33CA3324}" type="datetimeFigureOut">
               <a:rPr lang="en-IN" smtClean="0"/>
-              <a:t>10-07-2022</a:t>
+              <a:t>17-07-2022</a:t>
             </a:fld>
             <a:endParaRPr lang="en-IN"/>
           </a:p>
@@ -2408,7 +2409,7 @@
           <a:p>
             <a:fld id="{8E855F6B-8C8A-4ACC-9008-4FFC33CA3324}" type="datetimeFigureOut">
               <a:rPr lang="en-IN" smtClean="0"/>
-              <a:t>10-07-2022</a:t>
+              <a:t>17-07-2022</a:t>
             </a:fld>
             <a:endParaRPr lang="en-IN"/>
           </a:p>
@@ -2697,7 +2698,7 @@
           <a:p>
             <a:fld id="{8E855F6B-8C8A-4ACC-9008-4FFC33CA3324}" type="datetimeFigureOut">
               <a:rPr lang="en-IN" smtClean="0"/>
-              <a:t>10-07-2022</a:t>
+              <a:t>17-07-2022</a:t>
             </a:fld>
             <a:endParaRPr lang="en-IN"/>
           </a:p>
@@ -2940,7 +2941,7 @@
           <a:p>
             <a:fld id="{8E855F6B-8C8A-4ACC-9008-4FFC33CA3324}" type="datetimeFigureOut">
               <a:rPr lang="en-IN" smtClean="0"/>
-              <a:t>10-07-2022</a:t>
+              <a:t>17-07-2022</a:t>
             </a:fld>
             <a:endParaRPr lang="en-IN"/>
           </a:p>
@@ -5769,14 +5770,21 @@
             <p:ph type="title"/>
           </p:nvPr>
         </p:nvSpPr>
-        <p:spPr/>
+        <p:spPr>
+          <a:xfrm>
+            <a:off x="838200" y="102478"/>
+            <a:ext cx="10515600" cy="1325563"/>
+          </a:xfrm>
+        </p:spPr>
         <p:txBody>
-          <a:bodyPr/>
+          <a:bodyPr>
+            <a:normAutofit/>
+          </a:bodyPr>
           <a:lstStyle/>
           <a:p>
             <a:r>
               <a:rPr lang="en-IN" dirty="0"/>
-              <a:t>Fallback Server : Utilising Haystack NLP and Elasticsearch</a:t>
+              <a:t>Fallback Server : Utilising Haystack NLP and Elasticsearch(OpenSearch)</a:t>
             </a:r>
           </a:p>
         </p:txBody>
@@ -5797,33 +5805,19 @@
             <p:ph idx="1"/>
           </p:nvPr>
         </p:nvSpPr>
-        <p:spPr/>
+        <p:spPr>
+          <a:xfrm>
+            <a:off x="838200" y="1582433"/>
+            <a:ext cx="10515600" cy="4351338"/>
+          </a:xfrm>
+        </p:spPr>
         <p:txBody>
           <a:bodyPr>
             <a:normAutofit/>
           </a:bodyPr>
           <a:lstStyle/>
           <a:p>
-            <a:r>
-              <a:rPr lang="en-IN" dirty="0"/>
-              <a:t>Rasa stores responses in </a:t>
-            </a:r>
-            <a:r>
-              <a:rPr lang="en-IN" dirty="0" err="1"/>
-              <a:t>nlu.yaml</a:t>
-            </a:r>
-            <a:r>
-              <a:rPr lang="en-IN" dirty="0"/>
-              <a:t> and </a:t>
-            </a:r>
-            <a:r>
-              <a:rPr lang="en-IN" dirty="0" err="1"/>
-              <a:t>domain.yaml</a:t>
-            </a:r>
-            <a:r>
-              <a:rPr lang="en-IN" dirty="0"/>
-              <a:t> files for the predefined intents(questions) from the user.</a:t>
-            </a:r>
+            <a:endParaRPr lang="en-IN" dirty="0"/>
           </a:p>
           <a:p>
             <a:r>
@@ -5841,8 +5835,12 @@
           </a:p>
           <a:p>
             <a:r>
+              <a:rPr lang="en-IN" dirty="0" err="1"/>
+              <a:t>HayStack</a:t>
+            </a:r>
+            <a:r>
               <a:rPr lang="en-IN" dirty="0"/>
-              <a:t>Required document embeddings are generated and stored in the </a:t>
+              <a:t> uses ‘Retriever’ and ‘Reader’ objects to search and retrieve information  from </a:t>
             </a:r>
             <a:r>
               <a:rPr lang="en-IN" dirty="0" err="1"/>
@@ -5850,50 +5848,34 @@
             </a:r>
             <a:r>
               <a:rPr lang="en-IN" dirty="0"/>
-              <a:t> </a:t>
+              <a:t> (OpenSearch ).</a:t>
+            </a:r>
+          </a:p>
+          <a:p>
+            <a:pPr lvl="1"/>
+            <a:r>
+              <a:rPr lang="en-IN" dirty="0"/>
+              <a:t> Deep learning  Dense Passage retriever (DPR) model is used for generating embeddings and retriever component.</a:t>
+            </a:r>
+          </a:p>
+          <a:p>
+            <a:pPr lvl="1"/>
+            <a:r>
+              <a:rPr lang="en-IN" dirty="0"/>
+              <a:t>For reader component ‘</a:t>
             </a:r>
             <a:r>
               <a:rPr lang="en-IN" dirty="0" err="1"/>
-              <a:t>document_store</a:t>
+              <a:t>deepset</a:t>
             </a:r>
             <a:r>
               <a:rPr lang="en-IN" dirty="0"/>
-              <a:t>.  </a:t>
-            </a:r>
-          </a:p>
-          <a:p>
-            <a:r>
-              <a:rPr lang="en-IN" dirty="0" err="1"/>
-              <a:t>HayStack</a:t>
-            </a:r>
-            <a:r>
-              <a:rPr lang="en-IN" dirty="0"/>
-              <a:t> uses ‘Retriever’ and ‘Reader’ objects to search and </a:t>
-            </a:r>
-            <a:r>
-              <a:rPr lang="en-IN" dirty="0" err="1"/>
-              <a:t>reterive</a:t>
-            </a:r>
-            <a:r>
-              <a:rPr lang="en-IN" dirty="0"/>
-              <a:t> information   </a:t>
-            </a:r>
-            <a:r>
-              <a:rPr lang="en-IN" dirty="0" err="1"/>
-              <a:t>ElasticSearch</a:t>
-            </a:r>
-            <a:r>
-              <a:rPr lang="en-IN" dirty="0"/>
-              <a:t> </a:t>
-            </a:r>
-            <a:r>
-              <a:rPr lang="en-IN" dirty="0" err="1"/>
-              <a:t>document_store</a:t>
-            </a:r>
-            <a:r>
-              <a:rPr lang="en-IN" dirty="0"/>
-              <a:t> index.</a:t>
-            </a:r>
+              <a:t>/roberta-base-squad2’ beep learning model is used.</a:t>
+            </a:r>
+          </a:p>
+          <a:p>
+            <a:pPr lvl="1"/>
+            <a:endParaRPr lang="en-IN" dirty="0"/>
           </a:p>
           <a:p>
             <a:endParaRPr lang="en-IN" dirty="0"/>
@@ -5917,6 +5899,150 @@
 </file>
 
 <file path=ppt/slides/slide11.xml><?xml version="1.0" encoding="utf-8"?>
+<p:sld xmlns:a="http://schemas.openxmlformats.org/drawingml/2006/main" xmlns:r="http://schemas.openxmlformats.org/officeDocument/2006/relationships" xmlns:p="http://schemas.openxmlformats.org/presentationml/2006/main">
+  <p:cSld>
+    <p:spTree>
+      <p:nvGrpSpPr>
+        <p:cNvPr id="1" name=""/>
+        <p:cNvGrpSpPr/>
+        <p:nvPr/>
+      </p:nvGrpSpPr>
+      <p:grpSpPr>
+        <a:xfrm>
+          <a:off x="0" y="0"/>
+          <a:ext cx="0" cy="0"/>
+          <a:chOff x="0" y="0"/>
+          <a:chExt cx="0" cy="0"/>
+        </a:xfrm>
+      </p:grpSpPr>
+      <p:sp>
+        <p:nvSpPr>
+          <p:cNvPr id="2" name="Title 1">
+            <a:extLst>
+              <a:ext uri="{FF2B5EF4-FFF2-40B4-BE49-F238E27FC236}">
+                <a16:creationId xmlns:a16="http://schemas.microsoft.com/office/drawing/2014/main" id="{6FCC82AF-5589-A4CA-C143-7B7F91BDFE92}"/>
+              </a:ext>
+            </a:extLst>
+          </p:cNvPr>
+          <p:cNvSpPr>
+            <a:spLocks noGrp="1"/>
+          </p:cNvSpPr>
+          <p:nvPr>
+            <p:ph type="title"/>
+          </p:nvPr>
+        </p:nvSpPr>
+        <p:spPr>
+          <a:xfrm>
+            <a:off x="535020" y="330741"/>
+            <a:ext cx="9554183" cy="826850"/>
+          </a:xfrm>
+        </p:spPr>
+        <p:txBody>
+          <a:bodyPr>
+            <a:normAutofit/>
+          </a:bodyPr>
+          <a:lstStyle/>
+          <a:p>
+            <a:r>
+              <a:rPr lang="en-IN" dirty="0"/>
+              <a:t>Business Considerations:</a:t>
+            </a:r>
+          </a:p>
+        </p:txBody>
+      </p:sp>
+      <p:sp>
+        <p:nvSpPr>
+          <p:cNvPr id="3" name="Content Placeholder 2">
+            <a:extLst>
+              <a:ext uri="{FF2B5EF4-FFF2-40B4-BE49-F238E27FC236}">
+                <a16:creationId xmlns:a16="http://schemas.microsoft.com/office/drawing/2014/main" id="{0C6D9AE1-0FD7-085C-0955-41D8BBC7A743}"/>
+              </a:ext>
+            </a:extLst>
+          </p:cNvPr>
+          <p:cNvSpPr>
+            <a:spLocks noGrp="1"/>
+          </p:cNvSpPr>
+          <p:nvPr>
+            <p:ph idx="1"/>
+          </p:nvPr>
+        </p:nvSpPr>
+        <p:spPr>
+          <a:xfrm>
+            <a:off x="770105" y="1449420"/>
+            <a:ext cx="10515600" cy="4351338"/>
+          </a:xfrm>
+        </p:spPr>
+        <p:txBody>
+          <a:bodyPr>
+            <a:normAutofit/>
+          </a:bodyPr>
+          <a:lstStyle/>
+          <a:p>
+            <a:r>
+              <a:rPr lang="en-IN" dirty="0"/>
+              <a:t>All the technologies which are utilised in the solution are open source and uses </a:t>
+            </a:r>
+            <a:r>
+              <a:rPr lang="en-IN"/>
+              <a:t>state-of-art technological approaches</a:t>
+            </a:r>
+            <a:r>
+              <a:rPr lang="en-IN" dirty="0"/>
+              <a:t>.</a:t>
+            </a:r>
+          </a:p>
+          <a:p>
+            <a:r>
+              <a:rPr lang="en-IN" dirty="0"/>
+              <a:t>RASA NLU and Haystack uses transformer-based deep learning language models which be further fine-tuned or can be replaced to get higher performance and accuracy.</a:t>
+            </a:r>
+          </a:p>
+          <a:p>
+            <a:r>
+              <a:rPr lang="en-IN" dirty="0"/>
+              <a:t>RASA provides complete SDK which can be used to create custom pipelines using python.</a:t>
+            </a:r>
+          </a:p>
+          <a:p>
+            <a:r>
+              <a:rPr lang="en-IN" dirty="0"/>
+              <a:t>RASA also provides complete to  deploy in Kubernetes cluster and to easily integrate to other components.	https://github.com/RasaHQ/helm-charts/tree/main/charts/rasa</a:t>
+            </a:r>
+          </a:p>
+          <a:p>
+            <a:endParaRPr lang="en-IN" dirty="0"/>
+          </a:p>
+          <a:p>
+            <a:endParaRPr lang="en-IN" dirty="0"/>
+          </a:p>
+          <a:p>
+            <a:endParaRPr lang="en-IN" dirty="0"/>
+          </a:p>
+          <a:p>
+            <a:endParaRPr lang="en-IN" dirty="0"/>
+          </a:p>
+          <a:p>
+            <a:pPr marL="0" indent="0">
+              <a:buNone/>
+            </a:pPr>
+            <a:endParaRPr lang="en-IN" dirty="0"/>
+          </a:p>
+        </p:txBody>
+      </p:sp>
+    </p:spTree>
+    <p:extLst>
+      <p:ext uri="{BB962C8B-B14F-4D97-AF65-F5344CB8AC3E}">
+        <p14:creationId xmlns:p14="http://schemas.microsoft.com/office/powerpoint/2010/main" val="1819754006"/>
+      </p:ext>
+    </p:extLst>
+  </p:cSld>
+  <p:clrMapOvr>
+    <a:masterClrMapping/>
+  </p:clrMapOvr>
+</p:sld>
+</file>
+
+<file path=ppt/slides/slide12.xml><?xml version="1.0" encoding="utf-8"?>
 <p:sld xmlns:a="http://schemas.openxmlformats.org/drawingml/2006/main" xmlns:r="http://schemas.openxmlformats.org/officeDocument/2006/relationships" xmlns:p="http://schemas.openxmlformats.org/presentationml/2006/main">
   <p:cSld>
     <p:bg>
@@ -9365,157 +9491,6 @@
           <a:chExt cx="0" cy="0"/>
         </a:xfrm>
       </p:grpSpPr>
-      <p:sp>
-        <p:nvSpPr>
-          <p:cNvPr id="2" name="Title 1">
-            <a:extLst>
-              <a:ext uri="{FF2B5EF4-FFF2-40B4-BE49-F238E27FC236}">
-                <a16:creationId xmlns:a16="http://schemas.microsoft.com/office/drawing/2014/main" id="{E97AAD67-6551-974B-A813-4613F2D18880}"/>
-              </a:ext>
-            </a:extLst>
-          </p:cNvPr>
-          <p:cNvSpPr>
-            <a:spLocks noGrp="1"/>
-          </p:cNvSpPr>
-          <p:nvPr>
-            <p:ph type="title"/>
-          </p:nvPr>
-        </p:nvSpPr>
-        <p:spPr/>
-        <p:txBody>
-          <a:bodyPr/>
-          <a:lstStyle/>
-          <a:p>
-            <a:r>
-              <a:rPr lang="en-IN" dirty="0"/>
-              <a:t>Technologies Used:</a:t>
-            </a:r>
-          </a:p>
-        </p:txBody>
-      </p:sp>
-      <p:sp>
-        <p:nvSpPr>
-          <p:cNvPr id="3" name="Content Placeholder 2">
-            <a:extLst>
-              <a:ext uri="{FF2B5EF4-FFF2-40B4-BE49-F238E27FC236}">
-                <a16:creationId xmlns:a16="http://schemas.microsoft.com/office/drawing/2014/main" id="{6CA20FF2-27E3-E5FE-5FF6-82D4EE66B3DB}"/>
-              </a:ext>
-            </a:extLst>
-          </p:cNvPr>
-          <p:cNvSpPr>
-            <a:spLocks noGrp="1"/>
-          </p:cNvSpPr>
-          <p:nvPr>
-            <p:ph idx="1"/>
-          </p:nvPr>
-        </p:nvSpPr>
-        <p:spPr/>
-        <p:txBody>
-          <a:bodyPr>
-            <a:normAutofit fontScale="92500" lnSpcReduction="10000"/>
-          </a:bodyPr>
-          <a:lstStyle/>
-          <a:p>
-            <a:r>
-              <a:rPr lang="en-IN" dirty="0"/>
-              <a:t>Deep learning Chatbot to perform natural conversation and can provide useful information and provide interactive usage for the end users :</a:t>
-            </a:r>
-          </a:p>
-          <a:p>
-            <a:endParaRPr lang="en-IN" dirty="0"/>
-          </a:p>
-          <a:p>
-            <a:r>
-              <a:rPr lang="en-IN" dirty="0"/>
-              <a:t>React : front end web app.</a:t>
-            </a:r>
-          </a:p>
-          <a:p>
-            <a:r>
-              <a:rPr lang="en-IN" dirty="0"/>
-              <a:t>Chatbot UI : </a:t>
-            </a:r>
-            <a:r>
-              <a:rPr lang="en-IN" dirty="0" err="1"/>
-              <a:t>Botfront</a:t>
-            </a:r>
-            <a:endParaRPr lang="en-IN" dirty="0"/>
-          </a:p>
-          <a:p>
-            <a:r>
-              <a:rPr lang="en-IN" dirty="0"/>
-              <a:t>Conversational AI : Rasa Opensource ( ' Roberta' - deep learning model for NLU )</a:t>
-            </a:r>
-          </a:p>
-          <a:p>
-            <a:r>
-              <a:rPr lang="en-IN" dirty="0"/>
-              <a:t>haystack : NLP </a:t>
-            </a:r>
-            <a:r>
-              <a:rPr lang="en-IN" dirty="0" err="1"/>
-              <a:t>bsed</a:t>
-            </a:r>
-            <a:r>
-              <a:rPr lang="en-IN" dirty="0"/>
-              <a:t> Document search system for </a:t>
-            </a:r>
-            <a:r>
-              <a:rPr lang="en-IN" dirty="0" err="1"/>
-              <a:t>QnA</a:t>
-            </a:r>
-            <a:r>
-              <a:rPr lang="en-IN" dirty="0"/>
-              <a:t>  fallback usage.</a:t>
-            </a:r>
-          </a:p>
-          <a:p>
-            <a:r>
-              <a:rPr lang="en-IN" dirty="0" err="1"/>
-              <a:t>ElasticSearch</a:t>
-            </a:r>
-            <a:r>
-              <a:rPr lang="en-IN" dirty="0"/>
-              <a:t> : Storage of document embeddings which is utilised via </a:t>
-            </a:r>
-            <a:r>
-              <a:rPr lang="en-IN" dirty="0" err="1"/>
-              <a:t>HayStack</a:t>
-            </a:r>
-            <a:endParaRPr lang="en-IN" dirty="0"/>
-          </a:p>
-        </p:txBody>
-      </p:sp>
-    </p:spTree>
-    <p:extLst>
-      <p:ext uri="{BB962C8B-B14F-4D97-AF65-F5344CB8AC3E}">
-        <p14:creationId xmlns:p14="http://schemas.microsoft.com/office/powerpoint/2010/main" val="1367412341"/>
-      </p:ext>
-    </p:extLst>
-  </p:cSld>
-  <p:clrMapOvr>
-    <a:masterClrMapping/>
-  </p:clrMapOvr>
-</p:sld>
-</file>
-
-<file path=ppt/slides/slide3.xml><?xml version="1.0" encoding="utf-8"?>
-<p:sld xmlns:a="http://schemas.openxmlformats.org/drawingml/2006/main" xmlns:r="http://schemas.openxmlformats.org/officeDocument/2006/relationships" xmlns:p="http://schemas.openxmlformats.org/presentationml/2006/main">
-  <p:cSld>
-    <p:spTree>
-      <p:nvGrpSpPr>
-        <p:cNvPr id="1" name=""/>
-        <p:cNvGrpSpPr/>
-        <p:nvPr/>
-      </p:nvGrpSpPr>
-      <p:grpSpPr>
-        <a:xfrm>
-          <a:off x="0" y="0"/>
-          <a:ext cx="0" cy="0"/>
-          <a:chOff x="0" y="0"/>
-          <a:chExt cx="0" cy="0"/>
-        </a:xfrm>
-      </p:grpSpPr>
       <p:pic>
         <p:nvPicPr>
           <p:cNvPr id="1026" name="Picture 2">
@@ -9762,7 +9737,7 @@
         </p:nvSpPr>
         <p:spPr>
           <a:xfrm>
-            <a:off x="4419601" y="5060843"/>
+            <a:off x="4295511" y="5293805"/>
             <a:ext cx="988142" cy="461665"/>
           </a:xfrm>
           <a:prstGeom prst="rect">
@@ -10206,8 +10181,8 @@
         </p:nvSpPr>
         <p:spPr>
           <a:xfrm>
-            <a:off x="8025590" y="886318"/>
-            <a:ext cx="1494501" cy="276999"/>
+            <a:off x="7901442" y="709023"/>
+            <a:ext cx="1494501" cy="461665"/>
           </a:xfrm>
           <a:prstGeom prst="rect">
             <a:avLst/>
@@ -10231,14 +10206,39 @@
               </a:rPr>
               <a:t>ElasticSearch</a:t>
             </a:r>
-            <a:endParaRPr lang="en-IN" sz="1200" b="1" dirty="0">
-              <a:solidFill>
-                <a:schemeClr val="tx1">
-                  <a:lumMod val="75000"/>
-                  <a:lumOff val="25000"/>
-                </a:schemeClr>
-              </a:solidFill>
-            </a:endParaRPr>
+            <a:r>
+              <a:rPr lang="en-IN" sz="1200" b="1" dirty="0">
+                <a:solidFill>
+                  <a:schemeClr val="tx1">
+                    <a:lumMod val="75000"/>
+                    <a:lumOff val="25000"/>
+                  </a:schemeClr>
+                </a:solidFill>
+              </a:rPr>
+              <a:t> (</a:t>
+            </a:r>
+            <a:r>
+              <a:rPr lang="en-IN" sz="1200" b="1" dirty="0" err="1">
+                <a:solidFill>
+                  <a:schemeClr val="tx1">
+                    <a:lumMod val="75000"/>
+                    <a:lumOff val="25000"/>
+                  </a:schemeClr>
+                </a:solidFill>
+              </a:rPr>
+              <a:t>Opensearch</a:t>
+            </a:r>
+            <a:r>
+              <a:rPr lang="en-IN" sz="1200" b="1" dirty="0">
+                <a:solidFill>
+                  <a:schemeClr val="tx1">
+                    <a:lumMod val="75000"/>
+                    <a:lumOff val="25000"/>
+                  </a:schemeClr>
+                </a:solidFill>
+              </a:rPr>
+              <a:t>)</a:t>
+            </a:r>
           </a:p>
         </p:txBody>
       </p:sp>
@@ -10614,17 +10614,19 @@
               </a:ext>
             </a:extLst>
           </p:cNvPr>
-          <p:cNvCxnSpPr/>
+          <p:cNvCxnSpPr>
+            <a:cxnSpLocks/>
+          </p:cNvCxnSpPr>
           <p:nvPr/>
         </p:nvCxnSpPr>
         <p:spPr>
           <a:xfrm rot="10800000">
-            <a:off x="2124635" y="2618296"/>
-            <a:ext cx="4995168" cy="582705"/>
+            <a:off x="2108719" y="2811746"/>
+            <a:ext cx="5011085" cy="389256"/>
           </a:xfrm>
           <a:prstGeom prst="bentConnector3">
             <a:avLst>
-              <a:gd name="adj1" fmla="val 23977"/>
+              <a:gd name="adj1" fmla="val 19836"/>
             </a:avLst>
           </a:prstGeom>
           <a:ln>
@@ -10660,8 +10662,8 @@
         </p:nvSpPr>
         <p:spPr>
           <a:xfrm>
-            <a:off x="5737412" y="3325906"/>
-            <a:ext cx="1141616" cy="600164"/>
+            <a:off x="5737411" y="3325906"/>
+            <a:ext cx="1382391" cy="430887"/>
           </a:xfrm>
           <a:prstGeom prst="rect">
             <a:avLst/>
@@ -10674,6 +10676,7 @@
           </a:bodyPr>
           <a:lstStyle/>
           <a:p>
+            <a:pPr algn="ctr"/>
             <a:r>
               <a:rPr lang="en-IN" sz="1100" b="1" dirty="0">
                 <a:solidFill>
@@ -10683,49 +10686,8 @@
                   </a:schemeClr>
                 </a:solidFill>
               </a:rPr>
-              <a:t>Recommendations in </a:t>
-            </a:r>
-            <a:r>
-              <a:rPr lang="en-IN" sz="1100" b="1" dirty="0" err="1">
-                <a:solidFill>
-                  <a:schemeClr val="tx1">
-                    <a:lumMod val="75000"/>
-                    <a:lumOff val="25000"/>
-                  </a:schemeClr>
-                </a:solidFill>
-              </a:rPr>
-              <a:t>json</a:t>
-            </a:r>
-            <a:r>
-              <a:rPr lang="en-IN" sz="1100" b="1" dirty="0">
-                <a:solidFill>
-                  <a:schemeClr val="tx1">
-                    <a:lumMod val="75000"/>
-                    <a:lumOff val="25000"/>
-                  </a:schemeClr>
-                </a:solidFill>
-              </a:rPr>
-              <a:t> </a:t>
-            </a:r>
-            <a:r>
-              <a:rPr lang="en-IN" sz="1100" b="1" dirty="0" err="1">
-                <a:solidFill>
-                  <a:schemeClr val="tx1">
-                    <a:lumMod val="75000"/>
-                    <a:lumOff val="25000"/>
-                  </a:schemeClr>
-                </a:solidFill>
-              </a:rPr>
-              <a:t>fromat</a:t>
-            </a:r>
-            <a:endParaRPr lang="en-IN" sz="1100" b="1" dirty="0">
-              <a:solidFill>
-                <a:schemeClr val="tx1">
-                  <a:lumMod val="75000"/>
-                  <a:lumOff val="25000"/>
-                </a:schemeClr>
-              </a:solidFill>
-            </a:endParaRPr>
+              <a:t>Recommendations API response</a:t>
+            </a:r>
           </a:p>
         </p:txBody>
       </p:sp>
@@ -11151,6 +11113,202 @@
 </p:sld>
 </file>
 
+<file path=ppt/slides/slide3.xml><?xml version="1.0" encoding="utf-8"?>
+<p:sld xmlns:a="http://schemas.openxmlformats.org/drawingml/2006/main" xmlns:r="http://schemas.openxmlformats.org/officeDocument/2006/relationships" xmlns:p="http://schemas.openxmlformats.org/presentationml/2006/main">
+  <p:cSld>
+    <p:spTree>
+      <p:nvGrpSpPr>
+        <p:cNvPr id="1" name=""/>
+        <p:cNvGrpSpPr/>
+        <p:nvPr/>
+      </p:nvGrpSpPr>
+      <p:grpSpPr>
+        <a:xfrm>
+          <a:off x="0" y="0"/>
+          <a:ext cx="0" cy="0"/>
+          <a:chOff x="0" y="0"/>
+          <a:chExt cx="0" cy="0"/>
+        </a:xfrm>
+      </p:grpSpPr>
+      <p:sp>
+        <p:nvSpPr>
+          <p:cNvPr id="2" name="Title 1">
+            <a:extLst>
+              <a:ext uri="{FF2B5EF4-FFF2-40B4-BE49-F238E27FC236}">
+                <a16:creationId xmlns:a16="http://schemas.microsoft.com/office/drawing/2014/main" id="{E97AAD67-6551-974B-A813-4613F2D18880}"/>
+              </a:ext>
+            </a:extLst>
+          </p:cNvPr>
+          <p:cNvSpPr>
+            <a:spLocks noGrp="1"/>
+          </p:cNvSpPr>
+          <p:nvPr>
+            <p:ph type="title"/>
+          </p:nvPr>
+        </p:nvSpPr>
+        <p:spPr>
+          <a:xfrm>
+            <a:off x="651753" y="0"/>
+            <a:ext cx="10050294" cy="893020"/>
+          </a:xfrm>
+        </p:spPr>
+        <p:txBody>
+          <a:bodyPr/>
+          <a:lstStyle/>
+          <a:p>
+            <a:r>
+              <a:rPr lang="en-IN" dirty="0"/>
+              <a:t>Technologies Used:</a:t>
+            </a:r>
+          </a:p>
+        </p:txBody>
+      </p:sp>
+      <p:sp>
+        <p:nvSpPr>
+          <p:cNvPr id="3" name="Content Placeholder 2">
+            <a:extLst>
+              <a:ext uri="{FF2B5EF4-FFF2-40B4-BE49-F238E27FC236}">
+                <a16:creationId xmlns:a16="http://schemas.microsoft.com/office/drawing/2014/main" id="{6CA20FF2-27E3-E5FE-5FF6-82D4EE66B3DB}"/>
+              </a:ext>
+            </a:extLst>
+          </p:cNvPr>
+          <p:cNvSpPr>
+            <a:spLocks noGrp="1"/>
+          </p:cNvSpPr>
+          <p:nvPr>
+            <p:ph idx="1"/>
+          </p:nvPr>
+        </p:nvSpPr>
+        <p:spPr>
+          <a:xfrm>
+            <a:off x="544749" y="893020"/>
+            <a:ext cx="10809051" cy="5283943"/>
+          </a:xfrm>
+        </p:spPr>
+        <p:txBody>
+          <a:bodyPr>
+            <a:normAutofit fontScale="92500" lnSpcReduction="10000"/>
+          </a:bodyPr>
+          <a:lstStyle/>
+          <a:p>
+            <a:r>
+              <a:rPr lang="en-IN" dirty="0"/>
+              <a:t>Deep learning Chatbot to perform natural conversation and can provide useful information and provide interactive usage for the end users :</a:t>
+            </a:r>
+          </a:p>
+          <a:p>
+            <a:pPr marL="0" indent="0">
+              <a:buNone/>
+            </a:pPr>
+            <a:endParaRPr lang="en-IN" dirty="0"/>
+          </a:p>
+          <a:p>
+            <a:r>
+              <a:rPr lang="en-IN" dirty="0"/>
+              <a:t>React : Demo frontend web app. </a:t>
+            </a:r>
+            <a:r>
+              <a:rPr lang="en-IN" dirty="0">
+                <a:hlinkClick r:id="rId2"/>
+              </a:rPr>
+              <a:t>https://github.com/tarunmukku/exl-hackathon-web-form.git</a:t>
+            </a:r>
+            <a:endParaRPr lang="en-IN" dirty="0"/>
+          </a:p>
+          <a:p>
+            <a:r>
+              <a:rPr lang="en-IN" dirty="0"/>
+              <a:t>Chatbot UI : </a:t>
+            </a:r>
+            <a:r>
+              <a:rPr lang="en-IN" dirty="0" err="1"/>
+              <a:t>Botfront</a:t>
+            </a:r>
+            <a:r>
+              <a:rPr lang="en-IN" dirty="0"/>
+              <a:t> </a:t>
+            </a:r>
+            <a:r>
+              <a:rPr lang="en-IN" dirty="0">
+                <a:hlinkClick r:id="rId3"/>
+              </a:rPr>
+              <a:t>https://github.com/botfront/rasa-webchat.git</a:t>
+            </a:r>
+            <a:endParaRPr lang="en-IN" dirty="0"/>
+          </a:p>
+          <a:p>
+            <a:r>
+              <a:rPr lang="en-IN" dirty="0"/>
+              <a:t>Conversational AI : Rasa Opensource </a:t>
+            </a:r>
+            <a:r>
+              <a:rPr lang="en-IN" dirty="0">
+                <a:hlinkClick r:id="rId4"/>
+              </a:rPr>
+              <a:t>https://github.com/tarunmukku/exl-chatbot.git</a:t>
+            </a:r>
+            <a:endParaRPr lang="en-IN" dirty="0"/>
+          </a:p>
+          <a:p>
+            <a:r>
+              <a:rPr lang="en-IN" dirty="0"/>
+              <a:t>haystack : NLP based Document search system for </a:t>
+            </a:r>
+            <a:r>
+              <a:rPr lang="en-IN" dirty="0" err="1"/>
+              <a:t>QnA</a:t>
+            </a:r>
+            <a:r>
+              <a:rPr lang="en-IN" dirty="0"/>
+              <a:t>  fallback usage. </a:t>
+            </a:r>
+            <a:r>
+              <a:rPr lang="en-IN" dirty="0">
+                <a:hlinkClick r:id="rId4"/>
+              </a:rPr>
+              <a:t>https://github.com/tarunmukku/exl-chatbot.git</a:t>
+            </a:r>
+            <a:endParaRPr lang="en-IN" dirty="0"/>
+          </a:p>
+          <a:p>
+            <a:r>
+              <a:rPr lang="en-IN" dirty="0"/>
+              <a:t>OpenSearch : Storage of document embeddings which is utilised via </a:t>
+            </a:r>
+            <a:r>
+              <a:rPr lang="en-IN" dirty="0" err="1"/>
+              <a:t>HayStack</a:t>
+            </a:r>
+            <a:r>
+              <a:rPr lang="en-IN" dirty="0"/>
+              <a:t> (hosted in AWS ) </a:t>
+            </a:r>
+            <a:r>
+              <a:rPr lang="en-IN" dirty="0">
+                <a:hlinkClick r:id="rId5"/>
+              </a:rPr>
+              <a:t>https://github.com/tarunmukku/exl-chatbot/blob/main/ElasticSearch_Setup.ipynb</a:t>
+            </a:r>
+            <a:endParaRPr lang="en-IN" dirty="0"/>
+          </a:p>
+          <a:p>
+            <a:endParaRPr lang="en-IN" dirty="0"/>
+          </a:p>
+        </p:txBody>
+      </p:sp>
+    </p:spTree>
+    <p:extLst>
+      <p:ext uri="{BB962C8B-B14F-4D97-AF65-F5344CB8AC3E}">
+        <p14:creationId xmlns:p14="http://schemas.microsoft.com/office/powerpoint/2010/main" val="1367412341"/>
+      </p:ext>
+    </p:extLst>
+  </p:cSld>
+  <p:clrMapOvr>
+    <a:masterClrMapping/>
+  </p:clrMapOvr>
+</p:sld>
+</file>
+
 <file path=ppt/slides/slide4.xml><?xml version="1.0" encoding="utf-8"?>
 <p:sld xmlns:a="http://schemas.openxmlformats.org/drawingml/2006/main" xmlns:r="http://schemas.openxmlformats.org/officeDocument/2006/relationships" xmlns:p="http://schemas.openxmlformats.org/presentationml/2006/main">
   <p:cSld>
@@ -11228,14 +11386,14 @@
           <a:p>
             <a:r>
               <a:rPr lang="en-IN" dirty="0"/>
-              <a:t>Front-end :</a:t>
+              <a:t>Web Application  :</a:t>
             </a:r>
           </a:p>
           <a:p>
             <a:pPr lvl="1"/>
             <a:r>
               <a:rPr lang="en-IN" dirty="0"/>
-              <a:t>The web application form is</a:t>
+              <a:t>Sample demo web application form is</a:t>
             </a:r>
           </a:p>
           <a:p>
@@ -11244,42 +11402,42 @@
             </a:pPr>
             <a:r>
               <a:rPr lang="en-IN" dirty="0"/>
-              <a:t> built using react(localhost:3000) .</a:t>
-            </a:r>
-          </a:p>
-          <a:p>
-            <a:pPr lvl="1"/>
-            <a:r>
-              <a:rPr lang="en-IN" dirty="0"/>
-              <a:t>Chatbot UI is built</a:t>
-            </a:r>
-          </a:p>
-          <a:p>
-            <a:pPr lvl="1"/>
-            <a:r>
-              <a:rPr lang="en-IN" dirty="0"/>
-              <a:t> using </a:t>
-            </a:r>
-            <a:r>
-              <a:rPr lang="en-IN" dirty="0" err="1"/>
-              <a:t>BotFront</a:t>
-            </a:r>
-            <a:r>
-              <a:rPr lang="en-IN" dirty="0"/>
-              <a:t>.</a:t>
+              <a:t> built using react and Node JS.</a:t>
             </a:r>
           </a:p>
           <a:p>
             <a:pPr marL="457200" lvl="1" indent="0">
               <a:buNone/>
             </a:pPr>
-            <a:r>
-              <a:rPr lang="en-IN" dirty="0">
-                <a:hlinkClick r:id="rId2"/>
-              </a:rPr>
-              <a:t>https://github.com/botfront/rasa-webchat</a:t>
-            </a:r>
             <a:endParaRPr lang="en-IN" dirty="0"/>
+          </a:p>
+          <a:p>
+            <a:pPr lvl="1"/>
+            <a:endParaRPr lang="en-IN" dirty="0"/>
+          </a:p>
+          <a:p>
+            <a:pPr lvl="1"/>
+            <a:r>
+              <a:rPr lang="en-IN" dirty="0"/>
+              <a:t>Chatbot front end UI is built </a:t>
+            </a:r>
+          </a:p>
+          <a:p>
+            <a:pPr marL="457200" lvl="1" indent="0">
+              <a:buNone/>
+            </a:pPr>
+            <a:r>
+              <a:rPr lang="en-IN" dirty="0"/>
+              <a:t>using </a:t>
+            </a:r>
+            <a:r>
+              <a:rPr lang="en-IN" dirty="0" err="1"/>
+              <a:t>BotFront</a:t>
+            </a:r>
+            <a:r>
+              <a:rPr lang="en-IN" dirty="0"/>
+              <a:t>.</a:t>
+            </a:r>
           </a:p>
           <a:p>
             <a:pPr marL="457200" lvl="1" indent="0">
@@ -11322,7 +11480,7 @@
           <p:nvPr/>
         </p:nvPicPr>
         <p:blipFill>
-          <a:blip r:embed="rId3"/>
+          <a:blip r:embed="rId2"/>
           <a:stretch>
             <a:fillRect/>
           </a:stretch>
@@ -11369,172 +11527,6 @@
       </p:grpSpPr>
       <p:sp>
         <p:nvSpPr>
-          <p:cNvPr id="3" name="Content Placeholder 2">
-            <a:extLst>
-              <a:ext uri="{FF2B5EF4-FFF2-40B4-BE49-F238E27FC236}">
-                <a16:creationId xmlns:a16="http://schemas.microsoft.com/office/drawing/2014/main" id="{AA149202-81F6-622B-90DD-6D51CF902C68}"/>
-              </a:ext>
-            </a:extLst>
-          </p:cNvPr>
-          <p:cNvSpPr>
-            <a:spLocks noGrp="1"/>
-          </p:cNvSpPr>
-          <p:nvPr>
-            <p:ph idx="1"/>
-          </p:nvPr>
-        </p:nvSpPr>
-        <p:spPr>
-          <a:xfrm>
-            <a:off x="648929" y="550606"/>
-            <a:ext cx="10704871" cy="5626357"/>
-          </a:xfrm>
-        </p:spPr>
-        <p:txBody>
-          <a:bodyPr>
-            <a:normAutofit/>
-          </a:bodyPr>
-          <a:lstStyle/>
-          <a:p>
-            <a:r>
-              <a:rPr lang="en-IN" dirty="0"/>
-              <a:t>RASA Opensource:</a:t>
-            </a:r>
-          </a:p>
-          <a:p>
-            <a:pPr lvl="1"/>
-            <a:r>
-              <a:rPr lang="en-IN" dirty="0"/>
-              <a:t>RASA is used for </a:t>
-            </a:r>
-            <a:r>
-              <a:rPr lang="en-IN" dirty="0" err="1"/>
-              <a:t>NLU,Dialogue</a:t>
-            </a:r>
-            <a:r>
-              <a:rPr lang="en-IN" dirty="0"/>
-              <a:t> </a:t>
-            </a:r>
-            <a:r>
-              <a:rPr lang="en-IN" dirty="0" err="1"/>
-              <a:t>management,Entity</a:t>
-            </a:r>
-            <a:r>
-              <a:rPr lang="en-IN" dirty="0"/>
-              <a:t> extraction.</a:t>
-            </a:r>
-          </a:p>
-          <a:p>
-            <a:pPr marL="457200" lvl="1" indent="0">
-              <a:buNone/>
-            </a:pPr>
-            <a:r>
-              <a:rPr lang="en-IN" dirty="0"/>
-              <a:t>	Deep learning Language model ‘Roberta’ is used for Intent Management and Entity extraction.</a:t>
-            </a:r>
-          </a:p>
-          <a:p>
-            <a:pPr lvl="1"/>
-            <a:r>
-              <a:rPr lang="en-IN" dirty="0"/>
-              <a:t>RASA utilises  ‘Actions Server’(localhost:5505)   to interact with information from the other applications ( Recommendations system, </a:t>
-            </a:r>
-            <a:r>
-              <a:rPr lang="en-IN" dirty="0" err="1"/>
-              <a:t>HayStack</a:t>
-            </a:r>
-            <a:r>
-              <a:rPr lang="en-IN" dirty="0"/>
-              <a:t> for NLP </a:t>
-            </a:r>
-            <a:r>
-              <a:rPr lang="en-IN" dirty="0" err="1"/>
-              <a:t>QnA</a:t>
-            </a:r>
-            <a:r>
-              <a:rPr lang="en-IN" dirty="0"/>
-              <a:t> tasks).</a:t>
-            </a:r>
-          </a:p>
-          <a:p>
-            <a:pPr lvl="1"/>
-            <a:r>
-              <a:rPr lang="en-IN" dirty="0"/>
-              <a:t>RASA exposes a </a:t>
-            </a:r>
-            <a:r>
-              <a:rPr lang="en-IN" dirty="0" err="1"/>
-              <a:t>webSocket</a:t>
-            </a:r>
-            <a:r>
-              <a:rPr lang="en-IN" dirty="0"/>
-              <a:t> API (localhost:5005) which is consumed by the </a:t>
-            </a:r>
-            <a:r>
-              <a:rPr lang="en-IN" dirty="0" err="1"/>
-              <a:t>BotFront</a:t>
-            </a:r>
-            <a:r>
-              <a:rPr lang="en-IN" dirty="0"/>
-              <a:t> UI.</a:t>
-            </a:r>
-          </a:p>
-          <a:p>
-            <a:pPr lvl="1"/>
-            <a:r>
-              <a:rPr lang="en-IN" dirty="0"/>
-              <a:t>RASA also exposes REST API which can used to update conversation flows, configs, re-train and update the chatbot </a:t>
-            </a:r>
-            <a:r>
-              <a:rPr lang="en-IN" dirty="0" err="1"/>
-              <a:t>models.https</a:t>
-            </a:r>
-            <a:r>
-              <a:rPr lang="en-IN" dirty="0"/>
-              <a:t>://rasa.com/docs/rasa/pages/http-</a:t>
-            </a:r>
-            <a:r>
-              <a:rPr lang="en-IN" dirty="0" err="1"/>
-              <a:t>api</a:t>
-            </a:r>
-            <a:r>
-              <a:rPr lang="en-IN" dirty="0"/>
-              <a:t> </a:t>
-            </a:r>
-          </a:p>
-        </p:txBody>
-      </p:sp>
-    </p:spTree>
-    <p:extLst>
-      <p:ext uri="{BB962C8B-B14F-4D97-AF65-F5344CB8AC3E}">
-        <p14:creationId xmlns:p14="http://schemas.microsoft.com/office/powerpoint/2010/main" val="2453948275"/>
-      </p:ext>
-    </p:extLst>
-  </p:cSld>
-  <p:clrMapOvr>
-    <a:masterClrMapping/>
-  </p:clrMapOvr>
-</p:sld>
-</file>
-
-<file path=ppt/slides/slide6.xml><?xml version="1.0" encoding="utf-8"?>
-<p:sld xmlns:a="http://schemas.openxmlformats.org/drawingml/2006/main" xmlns:r="http://schemas.openxmlformats.org/officeDocument/2006/relationships" xmlns:p="http://schemas.openxmlformats.org/presentationml/2006/main">
-  <p:cSld>
-    <p:spTree>
-      <p:nvGrpSpPr>
-        <p:cNvPr id="1" name=""/>
-        <p:cNvGrpSpPr/>
-        <p:nvPr/>
-      </p:nvGrpSpPr>
-      <p:grpSpPr>
-        <a:xfrm>
-          <a:off x="0" y="0"/>
-          <a:ext cx="0" cy="0"/>
-          <a:chOff x="0" y="0"/>
-          <a:chExt cx="0" cy="0"/>
-        </a:xfrm>
-      </p:grpSpPr>
-      <p:sp>
-        <p:nvSpPr>
           <p:cNvPr id="4" name="TextBox 3">
             <a:extLst>
               <a:ext uri="{FF2B5EF4-FFF2-40B4-BE49-F238E27FC236}">
@@ -11694,6 +11686,172 @@
 </p:sld>
 </file>
 
+<file path=ppt/slides/slide6.xml><?xml version="1.0" encoding="utf-8"?>
+<p:sld xmlns:a="http://schemas.openxmlformats.org/drawingml/2006/main" xmlns:r="http://schemas.openxmlformats.org/officeDocument/2006/relationships" xmlns:p="http://schemas.openxmlformats.org/presentationml/2006/main">
+  <p:cSld>
+    <p:spTree>
+      <p:nvGrpSpPr>
+        <p:cNvPr id="1" name=""/>
+        <p:cNvGrpSpPr/>
+        <p:nvPr/>
+      </p:nvGrpSpPr>
+      <p:grpSpPr>
+        <a:xfrm>
+          <a:off x="0" y="0"/>
+          <a:ext cx="0" cy="0"/>
+          <a:chOff x="0" y="0"/>
+          <a:chExt cx="0" cy="0"/>
+        </a:xfrm>
+      </p:grpSpPr>
+      <p:sp>
+        <p:nvSpPr>
+          <p:cNvPr id="2" name="Title 1">
+            <a:extLst>
+              <a:ext uri="{FF2B5EF4-FFF2-40B4-BE49-F238E27FC236}">
+                <a16:creationId xmlns:a16="http://schemas.microsoft.com/office/drawing/2014/main" id="{00059EBC-CBBF-8B2C-2C77-C1820652FC69}"/>
+              </a:ext>
+            </a:extLst>
+          </p:cNvPr>
+          <p:cNvSpPr>
+            <a:spLocks noGrp="1"/>
+          </p:cNvSpPr>
+          <p:nvPr>
+            <p:ph type="title"/>
+          </p:nvPr>
+        </p:nvSpPr>
+        <p:spPr>
+          <a:xfrm>
+            <a:off x="317090" y="-30384"/>
+            <a:ext cx="10515600" cy="1325563"/>
+          </a:xfrm>
+        </p:spPr>
+        <p:txBody>
+          <a:bodyPr/>
+          <a:lstStyle/>
+          <a:p>
+            <a:r>
+              <a:rPr lang="en-IN" sz="4400" dirty="0"/>
+              <a:t>User Interactions with Chatbot (Contd. )</a:t>
+            </a:r>
+            <a:endParaRPr lang="en-IN" dirty="0"/>
+          </a:p>
+        </p:txBody>
+      </p:sp>
+      <p:sp>
+        <p:nvSpPr>
+          <p:cNvPr id="3" name="Content Placeholder 2">
+            <a:extLst>
+              <a:ext uri="{FF2B5EF4-FFF2-40B4-BE49-F238E27FC236}">
+                <a16:creationId xmlns:a16="http://schemas.microsoft.com/office/drawing/2014/main" id="{02DD48F1-FA8D-DB74-7064-CEE71E729EC7}"/>
+              </a:ext>
+            </a:extLst>
+          </p:cNvPr>
+          <p:cNvSpPr>
+            <a:spLocks noGrp="1"/>
+          </p:cNvSpPr>
+          <p:nvPr>
+            <p:ph idx="1"/>
+          </p:nvPr>
+        </p:nvSpPr>
+        <p:spPr>
+          <a:xfrm>
+            <a:off x="317090" y="1078373"/>
+            <a:ext cx="10515600" cy="4351338"/>
+          </a:xfrm>
+        </p:spPr>
+        <p:txBody>
+          <a:bodyPr/>
+          <a:lstStyle/>
+          <a:p>
+            <a:r>
+              <a:rPr lang="en-IN" dirty="0"/>
+              <a:t>The responses for intents can also be of images or videos .</a:t>
+            </a:r>
+          </a:p>
+          <a:p>
+            <a:endParaRPr lang="en-IN" dirty="0"/>
+          </a:p>
+          <a:p>
+            <a:endParaRPr lang="en-IN" dirty="0"/>
+          </a:p>
+          <a:p>
+            <a:endParaRPr lang="en-IN" dirty="0"/>
+          </a:p>
+        </p:txBody>
+      </p:sp>
+      <p:pic>
+        <p:nvPicPr>
+          <p:cNvPr id="5" name="Picture 4">
+            <a:extLst>
+              <a:ext uri="{FF2B5EF4-FFF2-40B4-BE49-F238E27FC236}">
+                <a16:creationId xmlns:a16="http://schemas.microsoft.com/office/drawing/2014/main" id="{3889C055-DE2B-C6E3-F177-9953A9AE7BB6}"/>
+              </a:ext>
+            </a:extLst>
+          </p:cNvPr>
+          <p:cNvPicPr>
+            <a:picLocks noChangeAspect="1"/>
+          </p:cNvPicPr>
+          <p:nvPr/>
+        </p:nvPicPr>
+        <p:blipFill>
+          <a:blip r:embed="rId2"/>
+          <a:stretch>
+            <a:fillRect/>
+          </a:stretch>
+        </p:blipFill>
+        <p:spPr>
+          <a:xfrm>
+            <a:off x="6186791" y="1642117"/>
+            <a:ext cx="4953157" cy="2643866"/>
+          </a:xfrm>
+          <a:prstGeom prst="rect">
+            <a:avLst/>
+          </a:prstGeom>
+        </p:spPr>
+      </p:pic>
+      <p:pic>
+        <p:nvPicPr>
+          <p:cNvPr id="8" name="Picture 7">
+            <a:extLst>
+              <a:ext uri="{FF2B5EF4-FFF2-40B4-BE49-F238E27FC236}">
+                <a16:creationId xmlns:a16="http://schemas.microsoft.com/office/drawing/2014/main" id="{16D762B8-5CF4-AEC2-399F-58A84FF1726C}"/>
+              </a:ext>
+            </a:extLst>
+          </p:cNvPr>
+          <p:cNvPicPr>
+            <a:picLocks noChangeAspect="1"/>
+          </p:cNvPicPr>
+          <p:nvPr/>
+        </p:nvPicPr>
+        <p:blipFill>
+          <a:blip r:embed="rId3"/>
+          <a:stretch>
+            <a:fillRect/>
+          </a:stretch>
+        </p:blipFill>
+        <p:spPr>
+          <a:xfrm>
+            <a:off x="166638" y="3282166"/>
+            <a:ext cx="5838572" cy="3256302"/>
+          </a:xfrm>
+          <a:prstGeom prst="rect">
+            <a:avLst/>
+          </a:prstGeom>
+        </p:spPr>
+      </p:pic>
+    </p:spTree>
+    <p:extLst>
+      <p:ext uri="{BB962C8B-B14F-4D97-AF65-F5344CB8AC3E}">
+        <p14:creationId xmlns:p14="http://schemas.microsoft.com/office/powerpoint/2010/main" val="3102593599"/>
+      </p:ext>
+    </p:extLst>
+  </p:cSld>
+  <p:clrMapOvr>
+    <a:masterClrMapping/>
+  </p:clrMapOvr>
+</p:sld>
+</file>
+
 <file path=ppt/slides/slide7.xml><?xml version="1.0" encoding="utf-8"?>
 <p:sld xmlns:a="http://schemas.openxmlformats.org/drawingml/2006/main" xmlns:r="http://schemas.openxmlformats.org/officeDocument/2006/relationships" xmlns:p="http://schemas.openxmlformats.org/presentationml/2006/main">
   <p:cSld>
@@ -11763,8 +11921,8 @@
         </p:nvSpPr>
         <p:spPr>
           <a:xfrm>
-            <a:off x="317090" y="1078373"/>
-            <a:ext cx="10515600" cy="4351338"/>
+            <a:off x="317089" y="1078372"/>
+            <a:ext cx="11393129" cy="4938969"/>
           </a:xfrm>
         </p:spPr>
         <p:txBody>
@@ -11773,11 +11931,8 @@
           <a:p>
             <a:r>
               <a:rPr lang="en-IN" dirty="0"/>
-              <a:t>The responses for intents can also be of image type.</a:t>
-            </a:r>
-          </a:p>
-          <a:p>
-            <a:endParaRPr lang="en-IN" dirty="0"/>
+              <a:t>For product recommendations, the UI also shows up with interactive buttons and carousel for user interaction</a:t>
+            </a:r>
           </a:p>
           <a:p>
             <a:endParaRPr lang="en-IN" dirty="0"/>
@@ -11789,10 +11944,10 @@
       </p:sp>
       <p:pic>
         <p:nvPicPr>
-          <p:cNvPr id="5" name="Picture 4">
-            <a:extLst>
-              <a:ext uri="{FF2B5EF4-FFF2-40B4-BE49-F238E27FC236}">
-                <a16:creationId xmlns:a16="http://schemas.microsoft.com/office/drawing/2014/main" id="{3889C055-DE2B-C6E3-F177-9953A9AE7BB6}"/>
+          <p:cNvPr id="6" name="Picture 5">
+            <a:extLst>
+              <a:ext uri="{FF2B5EF4-FFF2-40B4-BE49-F238E27FC236}">
+                <a16:creationId xmlns:a16="http://schemas.microsoft.com/office/drawing/2014/main" id="{CBBE85FF-D1A4-837B-2BD6-E941DCC97C5A}"/>
               </a:ext>
             </a:extLst>
           </p:cNvPr>
@@ -11809,8 +11964,8 @@
         </p:blipFill>
         <p:spPr>
           <a:xfrm>
-            <a:off x="3777349" y="1642116"/>
-            <a:ext cx="7362599" cy="3929963"/>
+            <a:off x="3634422" y="2077525"/>
+            <a:ext cx="6336292" cy="3702103"/>
           </a:xfrm>
           <a:prstGeom prst="rect">
             <a:avLst/>
@@ -11820,7 +11975,7 @@
     </p:spTree>
     <p:extLst>
       <p:ext uri="{BB962C8B-B14F-4D97-AF65-F5344CB8AC3E}">
-        <p14:creationId xmlns:p14="http://schemas.microsoft.com/office/powerpoint/2010/main" val="3102593599"/>
+        <p14:creationId xmlns:p14="http://schemas.microsoft.com/office/powerpoint/2010/main" val="2778537080"/>
       </p:ext>
     </p:extLst>
   </p:cSld>
@@ -11849,44 +12004,10 @@
       </p:grpSpPr>
       <p:sp>
         <p:nvSpPr>
-          <p:cNvPr id="2" name="Title 1">
-            <a:extLst>
-              <a:ext uri="{FF2B5EF4-FFF2-40B4-BE49-F238E27FC236}">
-                <a16:creationId xmlns:a16="http://schemas.microsoft.com/office/drawing/2014/main" id="{00059EBC-CBBF-8B2C-2C77-C1820652FC69}"/>
-              </a:ext>
-            </a:extLst>
-          </p:cNvPr>
-          <p:cNvSpPr>
-            <a:spLocks noGrp="1"/>
-          </p:cNvSpPr>
-          <p:nvPr>
-            <p:ph type="title"/>
-          </p:nvPr>
-        </p:nvSpPr>
-        <p:spPr>
-          <a:xfrm>
-            <a:off x="317090" y="18255"/>
-            <a:ext cx="10515600" cy="1325563"/>
-          </a:xfrm>
-        </p:spPr>
-        <p:txBody>
-          <a:bodyPr/>
-          <a:lstStyle/>
-          <a:p>
-            <a:r>
-              <a:rPr lang="en-IN" sz="4400" dirty="0"/>
-              <a:t>User Interactions with Chatbot (Contd. )</a:t>
-            </a:r>
-            <a:endParaRPr lang="en-IN" dirty="0"/>
-          </a:p>
-        </p:txBody>
-      </p:sp>
-      <p:sp>
-        <p:nvSpPr>
           <p:cNvPr id="3" name="Content Placeholder 2">
             <a:extLst>
               <a:ext uri="{FF2B5EF4-FFF2-40B4-BE49-F238E27FC236}">
-                <a16:creationId xmlns:a16="http://schemas.microsoft.com/office/drawing/2014/main" id="{02DD48F1-FA8D-DB74-7064-CEE71E729EC7}"/>
+                <a16:creationId xmlns:a16="http://schemas.microsoft.com/office/drawing/2014/main" id="{AA149202-81F6-622B-90DD-6D51CF902C68}"/>
               </a:ext>
             </a:extLst>
           </p:cNvPr>
@@ -11899,61 +12020,154 @@
         </p:nvSpPr>
         <p:spPr>
           <a:xfrm>
-            <a:off x="317089" y="1078372"/>
-            <a:ext cx="11393129" cy="4938969"/>
+            <a:off x="648929" y="550606"/>
+            <a:ext cx="10704871" cy="5626357"/>
           </a:xfrm>
         </p:spPr>
         <p:txBody>
-          <a:bodyPr/>
+          <a:bodyPr>
+            <a:normAutofit lnSpcReduction="10000"/>
+          </a:bodyPr>
           <a:lstStyle/>
           <a:p>
             <a:r>
+              <a:rPr lang="en-IN" b="1" dirty="0"/>
+              <a:t>RASA Opensource:</a:t>
+            </a:r>
+          </a:p>
+          <a:p>
+            <a:pPr lvl="1"/>
+            <a:r>
+              <a:rPr lang="en-IN" b="1" dirty="0"/>
+              <a:t>RASA NLU </a:t>
+            </a:r>
+          </a:p>
+          <a:p>
+            <a:pPr lvl="2"/>
+            <a:r>
               <a:rPr lang="en-IN" dirty="0"/>
-              <a:t>For product recommendations, the UI also shows up with interactive buttons and carousel for user interaction</a:t>
-            </a:r>
-          </a:p>
-          <a:p>
+              <a:t>RASA is used for NLU, Dialogue management, Entity extraction.</a:t>
+            </a:r>
+          </a:p>
+          <a:p>
+            <a:pPr lvl="2"/>
+            <a:r>
+              <a:rPr lang="en-IN" dirty="0"/>
+              <a:t>Deep learning Language model </a:t>
+            </a:r>
+            <a:r>
+              <a:rPr lang="en-IN" b="1" dirty="0"/>
+              <a:t>‘Roberta’</a:t>
+            </a:r>
+            <a:r>
+              <a:rPr lang="en-IN" dirty="0"/>
+              <a:t> is used for Intent Management and Entity extraction.</a:t>
+            </a:r>
+          </a:p>
+          <a:p>
+            <a:pPr lvl="2"/>
+            <a:r>
+              <a:rPr lang="en-IN" dirty="0"/>
+              <a:t>RASA model is based on pre-defined intents, utterances, entities, policies and other configurations.</a:t>
+            </a:r>
+          </a:p>
+          <a:p>
+            <a:pPr lvl="2"/>
+            <a:r>
+              <a:rPr lang="en-IN" dirty="0"/>
+              <a:t>RASA exposes a </a:t>
+            </a:r>
+            <a:r>
+              <a:rPr lang="en-IN" dirty="0" err="1"/>
+              <a:t>webSocket</a:t>
+            </a:r>
+            <a:r>
+              <a:rPr lang="en-IN" dirty="0"/>
+              <a:t> API which is consumed by the </a:t>
+            </a:r>
+            <a:r>
+              <a:rPr lang="en-IN" dirty="0" err="1"/>
+              <a:t>BotFront</a:t>
+            </a:r>
+            <a:r>
+              <a:rPr lang="en-IN" dirty="0"/>
+              <a:t> UI.</a:t>
+            </a:r>
+          </a:p>
+          <a:p>
+            <a:pPr lvl="2"/>
+            <a:r>
+              <a:rPr lang="en-IN" dirty="0"/>
+              <a:t>RASA also exposes REST API which can used to update conversation flows, configs, re-train and update the chatbot models. https://rasa.com/docs/rasa/pages/http-api </a:t>
+            </a:r>
+            <a:endParaRPr lang="en-IN" sz="2400" b="1" dirty="0"/>
+          </a:p>
+          <a:p>
+            <a:pPr marL="703262" lvl="2" indent="-342900"/>
+            <a:r>
+              <a:rPr lang="en-IN" sz="2400" b="1" dirty="0"/>
+              <a:t>Actions Server</a:t>
+            </a:r>
+          </a:p>
+          <a:p>
+            <a:pPr marL="1166813" lvl="2" indent="-342900"/>
+            <a:r>
+              <a:rPr lang="en-IN" dirty="0"/>
+              <a:t>RASA utilises  ‘Actions Server’ to  perform custom actions based on user intents using </a:t>
+            </a:r>
+          </a:p>
+          <a:p>
+            <a:pPr marL="1166813" lvl="2" indent="-360363">
+              <a:buNone/>
+            </a:pPr>
+            <a:r>
+              <a:rPr lang="en-IN" dirty="0"/>
+              <a:t>	python code.</a:t>
+            </a:r>
+          </a:p>
+          <a:p>
+            <a:pPr marL="1166813" lvl="2" indent="-360363"/>
+            <a:r>
+              <a:rPr lang="en-IN" dirty="0"/>
+              <a:t>Actions server is also used to connect to 3</a:t>
+            </a:r>
+            <a:r>
+              <a:rPr lang="en-IN" baseline="30000" dirty="0"/>
+              <a:t>rd</a:t>
+            </a:r>
+            <a:r>
+              <a:rPr lang="en-IN" dirty="0"/>
+              <a:t> party apps or other systems via REST API.</a:t>
+            </a:r>
+          </a:p>
+          <a:p>
+            <a:pPr marL="1166813" lvl="2" indent="-360363"/>
+            <a:r>
+              <a:rPr lang="en-IN" dirty="0"/>
+              <a:t>Product recommendations for cross-selling or upselling are fetched via actions server.</a:t>
+            </a:r>
+          </a:p>
+          <a:p>
+            <a:pPr marL="1166813" lvl="2" indent="-360363"/>
+            <a:r>
+              <a:rPr lang="en-IN" dirty="0"/>
+              <a:t>Actions server is also used in integrations to Haystack NLP framework search systems for ODQA. </a:t>
+            </a:r>
+          </a:p>
+          <a:p>
+            <a:pPr marL="1166813" lvl="2" indent="-360363"/>
             <a:endParaRPr lang="en-IN" dirty="0"/>
           </a:p>
           <a:p>
+            <a:pPr marL="703262" lvl="2" indent="-342900"/>
             <a:endParaRPr lang="en-IN" dirty="0"/>
           </a:p>
         </p:txBody>
       </p:sp>
-      <p:pic>
-        <p:nvPicPr>
-          <p:cNvPr id="6" name="Picture 5">
-            <a:extLst>
-              <a:ext uri="{FF2B5EF4-FFF2-40B4-BE49-F238E27FC236}">
-                <a16:creationId xmlns:a16="http://schemas.microsoft.com/office/drawing/2014/main" id="{CBBE85FF-D1A4-837B-2BD6-E941DCC97C5A}"/>
-              </a:ext>
-            </a:extLst>
-          </p:cNvPr>
-          <p:cNvPicPr>
-            <a:picLocks noChangeAspect="1"/>
-          </p:cNvPicPr>
-          <p:nvPr/>
-        </p:nvPicPr>
-        <p:blipFill>
-          <a:blip r:embed="rId2"/>
-          <a:stretch>
-            <a:fillRect/>
-          </a:stretch>
-        </p:blipFill>
-        <p:spPr>
-          <a:xfrm>
-            <a:off x="3634422" y="2077525"/>
-            <a:ext cx="6336292" cy="3702103"/>
-          </a:xfrm>
-          <a:prstGeom prst="rect">
-            <a:avLst/>
-          </a:prstGeom>
-        </p:spPr>
-      </p:pic>
     </p:spTree>
     <p:extLst>
       <p:ext uri="{BB962C8B-B14F-4D97-AF65-F5344CB8AC3E}">
-        <p14:creationId xmlns:p14="http://schemas.microsoft.com/office/powerpoint/2010/main" val="2778537080"/>
+        <p14:creationId xmlns:p14="http://schemas.microsoft.com/office/powerpoint/2010/main" val="2453948275"/>
       </p:ext>
     </p:extLst>
   </p:cSld>

</xml_diff>